<commit_message>
upgrade project to the latest Vistual Studio
</commit_message>
<xml_diff>
--- a/docs/DAE to binary structure_20220326.pptx
+++ b/docs/DAE to binary structure_20220326.pptx
@@ -279,7 +279,7 @@
           <a:p>
             <a:fld id="{B2678478-075C-4254-9D50-CE1E7AF0251E}" type="datetimeFigureOut">
               <a:rPr lang="en-US" smtClean="0"/>
-              <a:t>6/24/2022</a:t>
+              <a:t>7/9/2023</a:t>
             </a:fld>
             <a:endParaRPr lang="en-US"/>
           </a:p>
@@ -479,7 +479,7 @@
           <a:p>
             <a:fld id="{B2678478-075C-4254-9D50-CE1E7AF0251E}" type="datetimeFigureOut">
               <a:rPr lang="en-US" smtClean="0"/>
-              <a:t>6/24/2022</a:t>
+              <a:t>7/9/2023</a:t>
             </a:fld>
             <a:endParaRPr lang="en-US"/>
           </a:p>
@@ -689,7 +689,7 @@
           <a:p>
             <a:fld id="{B2678478-075C-4254-9D50-CE1E7AF0251E}" type="datetimeFigureOut">
               <a:rPr lang="en-US" smtClean="0"/>
-              <a:t>6/24/2022</a:t>
+              <a:t>7/9/2023</a:t>
             </a:fld>
             <a:endParaRPr lang="en-US"/>
           </a:p>
@@ -889,7 +889,7 @@
           <a:p>
             <a:fld id="{B2678478-075C-4254-9D50-CE1E7AF0251E}" type="datetimeFigureOut">
               <a:rPr lang="en-US" smtClean="0"/>
-              <a:t>6/24/2022</a:t>
+              <a:t>7/9/2023</a:t>
             </a:fld>
             <a:endParaRPr lang="en-US"/>
           </a:p>
@@ -1165,7 +1165,7 @@
           <a:p>
             <a:fld id="{B2678478-075C-4254-9D50-CE1E7AF0251E}" type="datetimeFigureOut">
               <a:rPr lang="en-US" smtClean="0"/>
-              <a:t>6/24/2022</a:t>
+              <a:t>7/9/2023</a:t>
             </a:fld>
             <a:endParaRPr lang="en-US"/>
           </a:p>
@@ -1433,7 +1433,7 @@
           <a:p>
             <a:fld id="{B2678478-075C-4254-9D50-CE1E7AF0251E}" type="datetimeFigureOut">
               <a:rPr lang="en-US" smtClean="0"/>
-              <a:t>6/24/2022</a:t>
+              <a:t>7/9/2023</a:t>
             </a:fld>
             <a:endParaRPr lang="en-US"/>
           </a:p>
@@ -1848,7 +1848,7 @@
           <a:p>
             <a:fld id="{B2678478-075C-4254-9D50-CE1E7AF0251E}" type="datetimeFigureOut">
               <a:rPr lang="en-US" smtClean="0"/>
-              <a:t>6/24/2022</a:t>
+              <a:t>7/9/2023</a:t>
             </a:fld>
             <a:endParaRPr lang="en-US"/>
           </a:p>
@@ -1990,7 +1990,7 @@
           <a:p>
             <a:fld id="{B2678478-075C-4254-9D50-CE1E7AF0251E}" type="datetimeFigureOut">
               <a:rPr lang="en-US" smtClean="0"/>
-              <a:t>6/24/2022</a:t>
+              <a:t>7/9/2023</a:t>
             </a:fld>
             <a:endParaRPr lang="en-US"/>
           </a:p>
@@ -2103,7 +2103,7 @@
           <a:p>
             <a:fld id="{B2678478-075C-4254-9D50-CE1E7AF0251E}" type="datetimeFigureOut">
               <a:rPr lang="en-US" smtClean="0"/>
-              <a:t>6/24/2022</a:t>
+              <a:t>7/9/2023</a:t>
             </a:fld>
             <a:endParaRPr lang="en-US"/>
           </a:p>
@@ -2416,7 +2416,7 @@
           <a:p>
             <a:fld id="{B2678478-075C-4254-9D50-CE1E7AF0251E}" type="datetimeFigureOut">
               <a:rPr lang="en-US" smtClean="0"/>
-              <a:t>6/24/2022</a:t>
+              <a:t>7/9/2023</a:t>
             </a:fld>
             <a:endParaRPr lang="en-US"/>
           </a:p>
@@ -2705,7 +2705,7 @@
           <a:p>
             <a:fld id="{B2678478-075C-4254-9D50-CE1E7AF0251E}" type="datetimeFigureOut">
               <a:rPr lang="en-US" smtClean="0"/>
-              <a:t>6/24/2022</a:t>
+              <a:t>7/9/2023</a:t>
             </a:fld>
             <a:endParaRPr lang="en-US"/>
           </a:p>
@@ -2948,7 +2948,7 @@
           <a:p>
             <a:fld id="{B2678478-075C-4254-9D50-CE1E7AF0251E}" type="datetimeFigureOut">
               <a:rPr lang="en-US" smtClean="0"/>
-              <a:t>6/24/2022</a:t>
+              <a:t>7/9/2023</a:t>
             </a:fld>
             <a:endParaRPr lang="en-US"/>
           </a:p>
@@ -17174,7 +17174,7 @@
         <p:spPr>
           <a:xfrm>
             <a:off x="299316" y="6339491"/>
-            <a:ext cx="6821098" cy="253916"/>
+            <a:ext cx="6952544" cy="253916"/>
           </a:xfrm>
           <a:prstGeom prst="rect">
             <a:avLst/>
@@ -17188,15 +17188,23 @@
           <a:p>
             <a:r>
               <a:rPr lang="en-US" sz="1050" dirty="0"/>
-              <a:t>(*) &lt;No of  indices&gt; = &lt;No of vertices</a:t>
+              <a:t>(*) &lt;No of  indices</a:t>
             </a:r>
             <a:r>
               <a:rPr lang="en-US" sz="1050"/>
-              <a:t>&gt; . This </a:t>
+              <a:t>&gt; == </a:t>
             </a:r>
             <a:r>
               <a:rPr lang="en-US" sz="1050" dirty="0"/>
-              <a:t>value is not needed but kept as I may update the engine for other forms later. </a:t>
+              <a:t>&lt;No of vertices</a:t>
+            </a:r>
+            <a:r>
+              <a:rPr lang="en-US" sz="1050"/>
+              <a:t>&gt; . </a:t>
+            </a:r>
+            <a:r>
+              <a:rPr lang="en-US" sz="1050" dirty="0"/>
+              <a:t>This value is not needed but kept as I may update the engine for other forms later. </a:t>
             </a:r>
             <a:endParaRPr lang="en-US" sz="1050" b="1" dirty="0"/>
           </a:p>

</xml_diff>

<commit_message>
convert the project to MS Visual Studio 2022
</commit_message>
<xml_diff>
--- a/docs/DAE to binary structure_20220326.pptx
+++ b/docs/DAE to binary structure_20220326.pptx
@@ -24,6 +24,7 @@
     <p:sldId id="268" r:id="rId18"/>
     <p:sldId id="266" r:id="rId19"/>
     <p:sldId id="259" r:id="rId20"/>
+    <p:sldId id="276" r:id="rId21"/>
   </p:sldIdLst>
   <p:sldSz cx="12192000" cy="6858000"/>
   <p:notesSz cx="6858000" cy="9144000"/>
@@ -279,7 +280,7 @@
           <a:p>
             <a:fld id="{B2678478-075C-4254-9D50-CE1E7AF0251E}" type="datetimeFigureOut">
               <a:rPr lang="en-US" smtClean="0"/>
-              <a:t>7/9/2023</a:t>
+              <a:t>7/2/2024</a:t>
             </a:fld>
             <a:endParaRPr lang="en-US"/>
           </a:p>
@@ -333,7 +334,7 @@
           <a:p>
             <a:fld id="{A5EE8381-2E74-4184-BFD7-535A103DC01B}" type="slidenum">
               <a:rPr lang="en-US" smtClean="0"/>
-              <a:t>‹Nr.›</a:t>
+              <a:t>‹#›</a:t>
             </a:fld>
             <a:endParaRPr lang="en-US"/>
           </a:p>
@@ -479,7 +480,7 @@
           <a:p>
             <a:fld id="{B2678478-075C-4254-9D50-CE1E7AF0251E}" type="datetimeFigureOut">
               <a:rPr lang="en-US" smtClean="0"/>
-              <a:t>7/9/2023</a:t>
+              <a:t>7/2/2024</a:t>
             </a:fld>
             <a:endParaRPr lang="en-US"/>
           </a:p>
@@ -533,7 +534,7 @@
           <a:p>
             <a:fld id="{A5EE8381-2E74-4184-BFD7-535A103DC01B}" type="slidenum">
               <a:rPr lang="en-US" smtClean="0"/>
-              <a:t>‹Nr.›</a:t>
+              <a:t>‹#›</a:t>
             </a:fld>
             <a:endParaRPr lang="en-US"/>
           </a:p>
@@ -689,7 +690,7 @@
           <a:p>
             <a:fld id="{B2678478-075C-4254-9D50-CE1E7AF0251E}" type="datetimeFigureOut">
               <a:rPr lang="en-US" smtClean="0"/>
-              <a:t>7/9/2023</a:t>
+              <a:t>7/2/2024</a:t>
             </a:fld>
             <a:endParaRPr lang="en-US"/>
           </a:p>
@@ -743,7 +744,7 @@
           <a:p>
             <a:fld id="{A5EE8381-2E74-4184-BFD7-535A103DC01B}" type="slidenum">
               <a:rPr lang="en-US" smtClean="0"/>
-              <a:t>‹Nr.›</a:t>
+              <a:t>‹#›</a:t>
             </a:fld>
             <a:endParaRPr lang="en-US"/>
           </a:p>
@@ -889,7 +890,7 @@
           <a:p>
             <a:fld id="{B2678478-075C-4254-9D50-CE1E7AF0251E}" type="datetimeFigureOut">
               <a:rPr lang="en-US" smtClean="0"/>
-              <a:t>7/9/2023</a:t>
+              <a:t>7/2/2024</a:t>
             </a:fld>
             <a:endParaRPr lang="en-US"/>
           </a:p>
@@ -943,7 +944,7 @@
           <a:p>
             <a:fld id="{A5EE8381-2E74-4184-BFD7-535A103DC01B}" type="slidenum">
               <a:rPr lang="en-US" smtClean="0"/>
-              <a:t>‹Nr.›</a:t>
+              <a:t>‹#›</a:t>
             </a:fld>
             <a:endParaRPr lang="en-US"/>
           </a:p>
@@ -1165,7 +1166,7 @@
           <a:p>
             <a:fld id="{B2678478-075C-4254-9D50-CE1E7AF0251E}" type="datetimeFigureOut">
               <a:rPr lang="en-US" smtClean="0"/>
-              <a:t>7/9/2023</a:t>
+              <a:t>7/2/2024</a:t>
             </a:fld>
             <a:endParaRPr lang="en-US"/>
           </a:p>
@@ -1219,7 +1220,7 @@
           <a:p>
             <a:fld id="{A5EE8381-2E74-4184-BFD7-535A103DC01B}" type="slidenum">
               <a:rPr lang="en-US" smtClean="0"/>
-              <a:t>‹Nr.›</a:t>
+              <a:t>‹#›</a:t>
             </a:fld>
             <a:endParaRPr lang="en-US"/>
           </a:p>
@@ -1433,7 +1434,7 @@
           <a:p>
             <a:fld id="{B2678478-075C-4254-9D50-CE1E7AF0251E}" type="datetimeFigureOut">
               <a:rPr lang="en-US" smtClean="0"/>
-              <a:t>7/9/2023</a:t>
+              <a:t>7/2/2024</a:t>
             </a:fld>
             <a:endParaRPr lang="en-US"/>
           </a:p>
@@ -1487,7 +1488,7 @@
           <a:p>
             <a:fld id="{A5EE8381-2E74-4184-BFD7-535A103DC01B}" type="slidenum">
               <a:rPr lang="en-US" smtClean="0"/>
-              <a:t>‹Nr.›</a:t>
+              <a:t>‹#›</a:t>
             </a:fld>
             <a:endParaRPr lang="en-US"/>
           </a:p>
@@ -1848,7 +1849,7 @@
           <a:p>
             <a:fld id="{B2678478-075C-4254-9D50-CE1E7AF0251E}" type="datetimeFigureOut">
               <a:rPr lang="en-US" smtClean="0"/>
-              <a:t>7/9/2023</a:t>
+              <a:t>7/2/2024</a:t>
             </a:fld>
             <a:endParaRPr lang="en-US"/>
           </a:p>
@@ -1902,7 +1903,7 @@
           <a:p>
             <a:fld id="{A5EE8381-2E74-4184-BFD7-535A103DC01B}" type="slidenum">
               <a:rPr lang="en-US" smtClean="0"/>
-              <a:t>‹Nr.›</a:t>
+              <a:t>‹#›</a:t>
             </a:fld>
             <a:endParaRPr lang="en-US"/>
           </a:p>
@@ -1990,7 +1991,7 @@
           <a:p>
             <a:fld id="{B2678478-075C-4254-9D50-CE1E7AF0251E}" type="datetimeFigureOut">
               <a:rPr lang="en-US" smtClean="0"/>
-              <a:t>7/9/2023</a:t>
+              <a:t>7/2/2024</a:t>
             </a:fld>
             <a:endParaRPr lang="en-US"/>
           </a:p>
@@ -2044,7 +2045,7 @@
           <a:p>
             <a:fld id="{A5EE8381-2E74-4184-BFD7-535A103DC01B}" type="slidenum">
               <a:rPr lang="en-US" smtClean="0"/>
-              <a:t>‹Nr.›</a:t>
+              <a:t>‹#›</a:t>
             </a:fld>
             <a:endParaRPr lang="en-US"/>
           </a:p>
@@ -2103,7 +2104,7 @@
           <a:p>
             <a:fld id="{B2678478-075C-4254-9D50-CE1E7AF0251E}" type="datetimeFigureOut">
               <a:rPr lang="en-US" smtClean="0"/>
-              <a:t>7/9/2023</a:t>
+              <a:t>7/2/2024</a:t>
             </a:fld>
             <a:endParaRPr lang="en-US"/>
           </a:p>
@@ -2157,7 +2158,7 @@
           <a:p>
             <a:fld id="{A5EE8381-2E74-4184-BFD7-535A103DC01B}" type="slidenum">
               <a:rPr lang="en-US" smtClean="0"/>
-              <a:t>‹Nr.›</a:t>
+              <a:t>‹#›</a:t>
             </a:fld>
             <a:endParaRPr lang="en-US"/>
           </a:p>
@@ -2416,7 +2417,7 @@
           <a:p>
             <a:fld id="{B2678478-075C-4254-9D50-CE1E7AF0251E}" type="datetimeFigureOut">
               <a:rPr lang="en-US" smtClean="0"/>
-              <a:t>7/9/2023</a:t>
+              <a:t>7/2/2024</a:t>
             </a:fld>
             <a:endParaRPr lang="en-US"/>
           </a:p>
@@ -2470,7 +2471,7 @@
           <a:p>
             <a:fld id="{A5EE8381-2E74-4184-BFD7-535A103DC01B}" type="slidenum">
               <a:rPr lang="en-US" smtClean="0"/>
-              <a:t>‹Nr.›</a:t>
+              <a:t>‹#›</a:t>
             </a:fld>
             <a:endParaRPr lang="en-US"/>
           </a:p>
@@ -2705,7 +2706,7 @@
           <a:p>
             <a:fld id="{B2678478-075C-4254-9D50-CE1E7AF0251E}" type="datetimeFigureOut">
               <a:rPr lang="en-US" smtClean="0"/>
-              <a:t>7/9/2023</a:t>
+              <a:t>7/2/2024</a:t>
             </a:fld>
             <a:endParaRPr lang="en-US"/>
           </a:p>
@@ -2759,7 +2760,7 @@
           <a:p>
             <a:fld id="{A5EE8381-2E74-4184-BFD7-535A103DC01B}" type="slidenum">
               <a:rPr lang="en-US" smtClean="0"/>
-              <a:t>‹Nr.›</a:t>
+              <a:t>‹#›</a:t>
             </a:fld>
             <a:endParaRPr lang="en-US"/>
           </a:p>
@@ -2948,7 +2949,7 @@
           <a:p>
             <a:fld id="{B2678478-075C-4254-9D50-CE1E7AF0251E}" type="datetimeFigureOut">
               <a:rPr lang="en-US" smtClean="0"/>
-              <a:t>7/9/2023</a:t>
+              <a:t>7/2/2024</a:t>
             </a:fld>
             <a:endParaRPr lang="en-US"/>
           </a:p>
@@ -3038,7 +3039,7 @@
           <a:p>
             <a:fld id="{A5EE8381-2E74-4184-BFD7-535A103DC01B}" type="slidenum">
               <a:rPr lang="en-US" smtClean="0"/>
-              <a:t>‹Nr.›</a:t>
+              <a:t>‹#›</a:t>
             </a:fld>
             <a:endParaRPr lang="en-US"/>
           </a:p>
@@ -11228,6 +11229,142 @@
 </p:sld>
 </file>
 
+<file path=ppt/slides/slide20.xml><?xml version="1.0" encoding="utf-8"?>
+<p:sld xmlns:a="http://schemas.openxmlformats.org/drawingml/2006/main" xmlns:r="http://schemas.openxmlformats.org/officeDocument/2006/relationships" xmlns:p="http://schemas.openxmlformats.org/presentationml/2006/main">
+  <p:cSld>
+    <p:spTree>
+      <p:nvGrpSpPr>
+        <p:cNvPr id="1" name=""/>
+        <p:cNvGrpSpPr/>
+        <p:nvPr/>
+      </p:nvGrpSpPr>
+      <p:grpSpPr>
+        <a:xfrm>
+          <a:off x="0" y="0"/>
+          <a:ext cx="0" cy="0"/>
+          <a:chOff x="0" y="0"/>
+          <a:chExt cx="0" cy="0"/>
+        </a:xfrm>
+      </p:grpSpPr>
+      <p:sp>
+        <p:nvSpPr>
+          <p:cNvPr id="2" name="Title 1">
+            <a:extLst>
+              <a:ext uri="{FF2B5EF4-FFF2-40B4-BE49-F238E27FC236}">
+                <a16:creationId xmlns:a16="http://schemas.microsoft.com/office/drawing/2014/main" id="{090C7B93-33C8-4EB1-825B-BB10B7516D0C}"/>
+              </a:ext>
+            </a:extLst>
+          </p:cNvPr>
+          <p:cNvSpPr>
+            <a:spLocks noGrp="1"/>
+          </p:cNvSpPr>
+          <p:nvPr>
+            <p:ph type="title"/>
+          </p:nvPr>
+        </p:nvSpPr>
+        <p:spPr/>
+        <p:txBody>
+          <a:bodyPr/>
+          <a:lstStyle/>
+          <a:p>
+            <a:r>
+              <a:rPr lang="en-GB" dirty="0"/>
+              <a:t>appendix</a:t>
+            </a:r>
+          </a:p>
+        </p:txBody>
+      </p:sp>
+      <p:sp>
+        <p:nvSpPr>
+          <p:cNvPr id="3" name="Content Placeholder 2">
+            <a:extLst>
+              <a:ext uri="{FF2B5EF4-FFF2-40B4-BE49-F238E27FC236}">
+                <a16:creationId xmlns:a16="http://schemas.microsoft.com/office/drawing/2014/main" id="{28AD5EE6-E3DA-462C-91D9-EE87EBBE235D}"/>
+              </a:ext>
+            </a:extLst>
+          </p:cNvPr>
+          <p:cNvSpPr>
+            <a:spLocks noGrp="1"/>
+          </p:cNvSpPr>
+          <p:nvPr>
+            <p:ph idx="1"/>
+          </p:nvPr>
+        </p:nvSpPr>
+        <p:spPr>
+          <a:xfrm>
+            <a:off x="838200" y="1825625"/>
+            <a:ext cx="10515600" cy="722842"/>
+          </a:xfrm>
+        </p:spPr>
+        <p:txBody>
+          <a:bodyPr>
+            <a:normAutofit fontScale="92500" lnSpcReduction="20000"/>
+          </a:bodyPr>
+          <a:lstStyle/>
+          <a:p>
+            <a:r>
+              <a:rPr lang="en-GB" dirty="0"/>
+              <a:t>Build </a:t>
+            </a:r>
+            <a:r>
+              <a:rPr lang="en-GB" dirty="0" err="1"/>
+              <a:t>Assimp</a:t>
+            </a:r>
+            <a:r>
+              <a:rPr lang="en-GB" dirty="0"/>
+              <a:t> </a:t>
+            </a:r>
+            <a:r>
+              <a:rPr lang="en-GB"/>
+              <a:t>from here: https://youtu.be/oci7xJEg6sU?si=52p716mh9MqGzqr2&amp;t=30</a:t>
+            </a:r>
+            <a:endParaRPr lang="en-GB" dirty="0"/>
+          </a:p>
+        </p:txBody>
+      </p:sp>
+      <p:pic>
+        <p:nvPicPr>
+          <p:cNvPr id="5" name="Picture 4">
+            <a:extLst>
+              <a:ext uri="{FF2B5EF4-FFF2-40B4-BE49-F238E27FC236}">
+                <a16:creationId xmlns:a16="http://schemas.microsoft.com/office/drawing/2014/main" id="{C89D8356-416B-469A-91E2-C29E5B678EA4}"/>
+              </a:ext>
+            </a:extLst>
+          </p:cNvPr>
+          <p:cNvPicPr>
+            <a:picLocks noChangeAspect="1"/>
+          </p:cNvPicPr>
+          <p:nvPr/>
+        </p:nvPicPr>
+        <p:blipFill>
+          <a:blip r:embed="rId2"/>
+          <a:stretch>
+            <a:fillRect/>
+          </a:stretch>
+        </p:blipFill>
+        <p:spPr>
+          <a:xfrm>
+            <a:off x="7380283" y="3259667"/>
+            <a:ext cx="3973517" cy="3358994"/>
+          </a:xfrm>
+          <a:prstGeom prst="rect">
+            <a:avLst/>
+          </a:prstGeom>
+        </p:spPr>
+      </p:pic>
+    </p:spTree>
+    <p:extLst>
+      <p:ext uri="{BB962C8B-B14F-4D97-AF65-F5344CB8AC3E}">
+        <p14:creationId xmlns:p14="http://schemas.microsoft.com/office/powerpoint/2010/main" val="1740379209"/>
+      </p:ext>
+    </p:extLst>
+  </p:cSld>
+  <p:clrMapOvr>
+    <a:masterClrMapping/>
+  </p:clrMapOvr>
+</p:sld>
+</file>
+
 <file path=ppt/slides/slide3.xml><?xml version="1.0" encoding="utf-8"?>
 <p:sld xmlns:a="http://schemas.openxmlformats.org/drawingml/2006/main" xmlns:r="http://schemas.openxmlformats.org/officeDocument/2006/relationships" xmlns:p="http://schemas.openxmlformats.org/presentationml/2006/main">
   <p:cSld>

</xml_diff>